<commit_message>
Veränderungen im lm model
</commit_message>
<xml_diff>
--- a/Daten zusammentragen für die Abgabe/Präsentation/Presentation_01.pptx
+++ b/Daten zusammentragen für die Abgabe/Präsentation/Presentation_01.pptx
@@ -25196,19 +25196,7 @@
             <a:endParaRPr lang="de-DE" dirty="0"/>
           </a:p>
           <a:p>
-            <a:pPr marR="0" lvl="0" algn="l" rtl="0">
-              <a:lnSpc>
-                <a:spcPct val="100000"/>
-              </a:lnSpc>
-              <a:spcBef>
-                <a:spcPts val="0"/>
-              </a:spcBef>
-              <a:spcAft>
-                <a:spcPts val="0"/>
-              </a:spcAft>
-              <a:buClr>
-                <a:srgbClr val="000000"/>
-              </a:buClr>
+            <a:pPr lvl="0">
               <a:buSzPts val="1600"/>
             </a:pPr>
             <a:r>
@@ -25233,7 +25221,7 @@
                   <a:schemeClr val="lt1"/>
                 </a:solidFill>
               </a:rPr>
-              <a:t>, vor Feiertag, Feiertag und nach Feiertag</a:t>
+              <a:t>, vor Feiertag, Feiertag, nach Feiertag und 1.-3. Weihnachtsfeiertag</a:t>
             </a:r>
           </a:p>
           <a:p>
@@ -25697,7 +25685,7 @@
                   <a:schemeClr val="lt1"/>
                 </a:solidFill>
               </a:rPr>
-              <a:t>, vor Feiertag, Feiertag und nach Feiertag</a:t>
+              <a:t>, vor Feiertag, Feiertag, nach Feiertag und 1.-3. Weihnachtsfeiertag</a:t>
             </a:r>
           </a:p>
           <a:p>
@@ -26965,36 +26953,19 @@
           </a:bodyPr>
           <a:lstStyle/>
           <a:p>
-            <a:pPr marL="0" marR="0" lvl="0" indent="0" algn="l" rtl="0">
-              <a:lnSpc>
-                <a:spcPct val="100000"/>
-              </a:lnSpc>
-              <a:spcBef>
-                <a:spcPts val="0"/>
-              </a:spcBef>
-              <a:spcAft>
-                <a:spcPts val="0"/>
-              </a:spcAft>
-              <a:buClr>
-                <a:schemeClr val="lt2"/>
-              </a:buClr>
-              <a:buSzPts val="1400"/>
-              <a:buFont typeface="Century Gothic"/>
-              <a:buNone/>
-            </a:pPr>
+            <a:pPr lvl="0"/>
             <a:r>
-              <a:rPr lang="en-US" sz="4200" b="0" i="0" u="none" strike="noStrike" cap="none">
-                <a:solidFill>
-                  <a:schemeClr val="lt2"/>
-                </a:solidFill>
-                <a:latin typeface="Century Gothic"/>
-                <a:ea typeface="Century Gothic"/>
-                <a:cs typeface="Century Gothic"/>
-                <a:sym typeface="Century Gothic"/>
-              </a:rPr>
-              <a:t>Input Data</a:t>
+              <a:rPr lang="de-DE" dirty="0"/>
+              <a:t>Ergebnisse der Schätzung einer SVM (MAPE je Warengruppe und Warengruppenumsätze</a:t>
             </a:r>
-            <a:endParaRPr/>
+            <a:br>
+              <a:rPr lang="de-DE" dirty="0"/>
+            </a:br>
+            <a:r>
+              <a:rPr lang="de-DE" dirty="0"/>
+              <a:t>für den 01.06.2019)</a:t>
+            </a:r>
+            <a:endParaRPr dirty="0"/>
           </a:p>
         </p:txBody>
       </p:sp>
@@ -27068,1386 +27039,35 @@
           </a:p>
         </p:txBody>
       </p:sp>
-      <p:graphicFrame>
-        <p:nvGraphicFramePr>
-          <p:cNvPr id="124" name="Shape 124"/>
-          <p:cNvGraphicFramePr/>
+      <p:pic>
+        <p:nvPicPr>
+          <p:cNvPr id="3" name="Grafik 2" descr="How to Interpret Regression Analysis Results: P-values and Coefficients - Mozilla Firefox">
+            <a:extLst>
+              <a:ext uri="{FF2B5EF4-FFF2-40B4-BE49-F238E27FC236}">
+                <a16:creationId xmlns:a16="http://schemas.microsoft.com/office/drawing/2014/main" id="{FC14CA50-897E-4EB3-8B9A-E4BCD6C94730}"/>
+              </a:ext>
+            </a:extLst>
+          </p:cNvPr>
+          <p:cNvPicPr>
+            <a:picLocks noChangeAspect="1"/>
+          </p:cNvPicPr>
           <p:nvPr/>
-        </p:nvGraphicFramePr>
-        <p:xfrm>
-          <a:off x="180975" y="1485900"/>
-          <a:ext cx="8782050" cy="5169674"/>
-        </p:xfrm>
-        <a:graphic>
-          <a:graphicData uri="http://schemas.openxmlformats.org/drawingml/2006/table">
-            <a:tbl>
-              <a:tblPr firstRow="1" bandRow="1">
-                <a:noFill/>
-                <a:tableStyleId>{1A96818F-306E-444A-A2EF-F316D5CB3B41}</a:tableStyleId>
-              </a:tblPr>
-              <a:tblGrid>
-                <a:gridCol w="1016325">
-                  <a:extLst>
-                    <a:ext uri="{9D8B030D-6E8A-4147-A177-3AD203B41FA5}">
-                      <a16:colId xmlns:a16="http://schemas.microsoft.com/office/drawing/2014/main" val="20000"/>
-                    </a:ext>
-                  </a:extLst>
-                </a:gridCol>
-                <a:gridCol w="964325">
-                  <a:extLst>
-                    <a:ext uri="{9D8B030D-6E8A-4147-A177-3AD203B41FA5}">
-                      <a16:colId xmlns:a16="http://schemas.microsoft.com/office/drawing/2014/main" val="20001"/>
-                    </a:ext>
-                  </a:extLst>
-                </a:gridCol>
-                <a:gridCol w="1205425">
-                  <a:extLst>
-                    <a:ext uri="{9D8B030D-6E8A-4147-A177-3AD203B41FA5}">
-                      <a16:colId xmlns:a16="http://schemas.microsoft.com/office/drawing/2014/main" val="20002"/>
-                    </a:ext>
-                  </a:extLst>
-                </a:gridCol>
-                <a:gridCol w="5595975">
-                  <a:extLst>
-                    <a:ext uri="{9D8B030D-6E8A-4147-A177-3AD203B41FA5}">
-                      <a16:colId xmlns:a16="http://schemas.microsoft.com/office/drawing/2014/main" val="20003"/>
-                    </a:ext>
-                  </a:extLst>
-                </a:gridCol>
-              </a:tblGrid>
-              <a:tr h="389625">
-                <a:tc>
-                  <a:txBody>
-                    <a:bodyPr/>
-                    <a:lstStyle/>
-                    <a:p>
-                      <a:pPr marL="0" marR="0" lvl="0" indent="0" algn="l" rtl="0">
-                        <a:lnSpc>
-                          <a:spcPct val="115000"/>
-                        </a:lnSpc>
-                        <a:spcBef>
-                          <a:spcPts val="0"/>
-                        </a:spcBef>
-                        <a:spcAft>
-                          <a:spcPts val="0"/>
-                        </a:spcAft>
-                        <a:buNone/>
-                      </a:pPr>
-                      <a:r>
-                        <a:rPr lang="en-US" sz="1200" u="none" strike="noStrike" cap="none"/>
-                        <a:t>Name</a:t>
-                      </a:r>
-                      <a:endParaRPr sz="1100" u="none" strike="noStrike" cap="none">
-                        <a:latin typeface="Calibri"/>
-                        <a:ea typeface="Calibri"/>
-                        <a:cs typeface="Calibri"/>
-                        <a:sym typeface="Calibri"/>
-                      </a:endParaRPr>
-                    </a:p>
-                  </a:txBody>
-                  <a:tcPr marL="40925" marR="40925" marT="0" marB="0"/>
-                </a:tc>
-                <a:tc>
-                  <a:txBody>
-                    <a:bodyPr/>
-                    <a:lstStyle/>
-                    <a:p>
-                      <a:pPr marL="0" marR="0" lvl="0" indent="0" algn="l" rtl="0">
-                        <a:lnSpc>
-                          <a:spcPct val="115000"/>
-                        </a:lnSpc>
-                        <a:spcBef>
-                          <a:spcPts val="0"/>
-                        </a:spcBef>
-                        <a:spcAft>
-                          <a:spcPts val="0"/>
-                        </a:spcAft>
-                        <a:buNone/>
-                      </a:pPr>
-                      <a:r>
-                        <a:rPr lang="en-US" sz="1200" u="none" strike="noStrike" cap="none"/>
-                        <a:t>Type</a:t>
-                      </a:r>
-                      <a:endParaRPr sz="1100" u="none" strike="noStrike" cap="none">
-                        <a:latin typeface="Calibri"/>
-                        <a:ea typeface="Calibri"/>
-                        <a:cs typeface="Calibri"/>
-                        <a:sym typeface="Calibri"/>
-                      </a:endParaRPr>
-                    </a:p>
-                  </a:txBody>
-                  <a:tcPr marL="40925" marR="40925" marT="0" marB="0"/>
-                </a:tc>
-                <a:tc>
-                  <a:txBody>
-                    <a:bodyPr/>
-                    <a:lstStyle/>
-                    <a:p>
-                      <a:pPr marL="0" marR="0" lvl="0" indent="0" algn="l" rtl="0">
-                        <a:lnSpc>
-                          <a:spcPct val="115000"/>
-                        </a:lnSpc>
-                        <a:spcBef>
-                          <a:spcPts val="0"/>
-                        </a:spcBef>
-                        <a:spcAft>
-                          <a:spcPts val="0"/>
-                        </a:spcAft>
-                        <a:buNone/>
-                      </a:pPr>
-                      <a:r>
-                        <a:rPr lang="en-US" sz="1200" u="none" strike="noStrike" cap="none"/>
-                        <a:t>Spatial Resolution</a:t>
-                      </a:r>
-                      <a:endParaRPr sz="1100" u="none" strike="noStrike" cap="none">
-                        <a:latin typeface="Calibri"/>
-                        <a:ea typeface="Calibri"/>
-                        <a:cs typeface="Calibri"/>
-                        <a:sym typeface="Calibri"/>
-                      </a:endParaRPr>
-                    </a:p>
-                  </a:txBody>
-                  <a:tcPr marL="40925" marR="40925" marT="0" marB="0"/>
-                </a:tc>
-                <a:tc>
-                  <a:txBody>
-                    <a:bodyPr/>
-                    <a:lstStyle/>
-                    <a:p>
-                      <a:pPr marL="0" marR="0" lvl="0" indent="0" algn="l" rtl="0">
-                        <a:lnSpc>
-                          <a:spcPct val="115000"/>
-                        </a:lnSpc>
-                        <a:spcBef>
-                          <a:spcPts val="0"/>
-                        </a:spcBef>
-                        <a:spcAft>
-                          <a:spcPts val="0"/>
-                        </a:spcAft>
-                        <a:buNone/>
-                      </a:pPr>
-                      <a:r>
-                        <a:rPr lang="en-US" sz="1200" u="none" strike="noStrike" cap="none"/>
-                        <a:t>Source</a:t>
-                      </a:r>
-                      <a:endParaRPr sz="1100" u="none" strike="noStrike" cap="none">
-                        <a:latin typeface="Calibri"/>
-                        <a:ea typeface="Calibri"/>
-                        <a:cs typeface="Calibri"/>
-                        <a:sym typeface="Calibri"/>
-                      </a:endParaRPr>
-                    </a:p>
-                  </a:txBody>
-                  <a:tcPr marL="40925" marR="40925" marT="0" marB="0"/>
-                </a:tc>
-                <a:extLst>
-                  <a:ext uri="{0D108BD9-81ED-4DB2-BD59-A6C34878D82A}">
-                    <a16:rowId xmlns:a16="http://schemas.microsoft.com/office/drawing/2014/main" val="10000"/>
-                  </a:ext>
-                </a:extLst>
-              </a:tr>
-              <a:tr h="500050">
-                <a:tc>
-                  <a:txBody>
-                    <a:bodyPr/>
-                    <a:lstStyle/>
-                    <a:p>
-                      <a:pPr marL="0" marR="0" lvl="0" indent="0" algn="l" rtl="0">
-                        <a:lnSpc>
-                          <a:spcPct val="115000"/>
-                        </a:lnSpc>
-                        <a:spcBef>
-                          <a:spcPts val="0"/>
-                        </a:spcBef>
-                        <a:spcAft>
-                          <a:spcPts val="0"/>
-                        </a:spcAft>
-                        <a:buNone/>
-                      </a:pPr>
-                      <a:r>
-                        <a:rPr lang="en-US" sz="1200" u="none" strike="noStrike" cap="none"/>
-                        <a:t>Land cover 2001</a:t>
-                      </a:r>
-                      <a:endParaRPr sz="1100" u="none" strike="noStrike" cap="none">
-                        <a:latin typeface="Calibri"/>
-                        <a:ea typeface="Calibri"/>
-                        <a:cs typeface="Calibri"/>
-                        <a:sym typeface="Calibri"/>
-                      </a:endParaRPr>
-                    </a:p>
-                  </a:txBody>
-                  <a:tcPr marL="40925" marR="40925" marT="0" marB="0"/>
-                </a:tc>
-                <a:tc>
-                  <a:txBody>
-                    <a:bodyPr/>
-                    <a:lstStyle/>
-                    <a:p>
-                      <a:pPr marL="0" marR="0" lvl="0" indent="0" algn="l" rtl="0">
-                        <a:lnSpc>
-                          <a:spcPct val="115000"/>
-                        </a:lnSpc>
-                        <a:spcBef>
-                          <a:spcPts val="0"/>
-                        </a:spcBef>
-                        <a:spcAft>
-                          <a:spcPts val="0"/>
-                        </a:spcAft>
-                        <a:buNone/>
-                      </a:pPr>
-                      <a:r>
-                        <a:rPr lang="en-US" sz="1200" u="none" strike="noStrike" cap="none"/>
-                        <a:t>Raster</a:t>
-                      </a:r>
-                      <a:endParaRPr sz="1100" u="none" strike="noStrike" cap="none">
-                        <a:latin typeface="Calibri"/>
-                        <a:ea typeface="Calibri"/>
-                        <a:cs typeface="Calibri"/>
-                        <a:sym typeface="Calibri"/>
-                      </a:endParaRPr>
-                    </a:p>
-                  </a:txBody>
-                  <a:tcPr marL="40925" marR="40925" marT="0" marB="0"/>
-                </a:tc>
-                <a:tc>
-                  <a:txBody>
-                    <a:bodyPr/>
-                    <a:lstStyle/>
-                    <a:p>
-                      <a:pPr marL="0" marR="0" lvl="0" indent="0" algn="l" rtl="0">
-                        <a:lnSpc>
-                          <a:spcPct val="115000"/>
-                        </a:lnSpc>
-                        <a:spcBef>
-                          <a:spcPts val="0"/>
-                        </a:spcBef>
-                        <a:spcAft>
-                          <a:spcPts val="0"/>
-                        </a:spcAft>
-                        <a:buNone/>
-                      </a:pPr>
-                      <a:r>
-                        <a:rPr lang="en-US" sz="1200" u="none" strike="noStrike" cap="none"/>
-                        <a:t>30m</a:t>
-                      </a:r>
-                      <a:endParaRPr sz="1100" u="none" strike="noStrike" cap="none">
-                        <a:latin typeface="Calibri"/>
-                        <a:ea typeface="Calibri"/>
-                        <a:cs typeface="Calibri"/>
-                        <a:sym typeface="Calibri"/>
-                      </a:endParaRPr>
-                    </a:p>
-                  </a:txBody>
-                  <a:tcPr marL="40925" marR="40925" marT="0" marB="0"/>
-                </a:tc>
-                <a:tc>
-                  <a:txBody>
-                    <a:bodyPr/>
-                    <a:lstStyle/>
-                    <a:p>
-                      <a:pPr marL="0" marR="0" lvl="0" indent="0" algn="l" rtl="0">
-                        <a:lnSpc>
-                          <a:spcPct val="115000"/>
-                        </a:lnSpc>
-                        <a:spcBef>
-                          <a:spcPts val="0"/>
-                        </a:spcBef>
-                        <a:spcAft>
-                          <a:spcPts val="0"/>
-                        </a:spcAft>
-                        <a:buNone/>
-                      </a:pPr>
-                      <a:r>
-                        <a:rPr lang="en-US" sz="1200" u="none" strike="noStrike" cap="none"/>
-                        <a:t>https://www.mrlc.gov/nlcd01_data.php</a:t>
-                      </a:r>
-                      <a:endParaRPr sz="1100" u="none" strike="noStrike" cap="none"/>
-                    </a:p>
-                    <a:p>
-                      <a:pPr marL="0" marR="0" lvl="0" indent="0" algn="l" rtl="0">
-                        <a:lnSpc>
-                          <a:spcPct val="115000"/>
-                        </a:lnSpc>
-                        <a:spcBef>
-                          <a:spcPts val="0"/>
-                        </a:spcBef>
-                        <a:spcAft>
-                          <a:spcPts val="0"/>
-                        </a:spcAft>
-                        <a:buNone/>
-                      </a:pPr>
-                      <a:r>
-                        <a:rPr lang="en-US" sz="1200" u="none" strike="noStrike" cap="none"/>
-                        <a:t> </a:t>
-                      </a:r>
-                      <a:endParaRPr sz="1100" u="none" strike="noStrike" cap="none">
-                        <a:latin typeface="Calibri"/>
-                        <a:ea typeface="Calibri"/>
-                        <a:cs typeface="Calibri"/>
-                        <a:sym typeface="Calibri"/>
-                      </a:endParaRPr>
-                    </a:p>
-                  </a:txBody>
-                  <a:tcPr marL="40925" marR="40925" marT="0" marB="0"/>
-                </a:tc>
-                <a:extLst>
-                  <a:ext uri="{0D108BD9-81ED-4DB2-BD59-A6C34878D82A}">
-                    <a16:rowId xmlns:a16="http://schemas.microsoft.com/office/drawing/2014/main" val="10001"/>
-                  </a:ext>
-                </a:extLst>
-              </a:tr>
-              <a:tr h="500050">
-                <a:tc>
-                  <a:txBody>
-                    <a:bodyPr/>
-                    <a:lstStyle/>
-                    <a:p>
-                      <a:pPr marL="0" marR="0" lvl="0" indent="0" algn="l" rtl="0">
-                        <a:lnSpc>
-                          <a:spcPct val="115000"/>
-                        </a:lnSpc>
-                        <a:spcBef>
-                          <a:spcPts val="0"/>
-                        </a:spcBef>
-                        <a:spcAft>
-                          <a:spcPts val="0"/>
-                        </a:spcAft>
-                        <a:buNone/>
-                      </a:pPr>
-                      <a:r>
-                        <a:rPr lang="en-US" sz="1200" u="none" strike="noStrike" cap="none"/>
-                        <a:t>Land cover 2006</a:t>
-                      </a:r>
-                      <a:endParaRPr sz="1100" u="none" strike="noStrike" cap="none">
-                        <a:latin typeface="Calibri"/>
-                        <a:ea typeface="Calibri"/>
-                        <a:cs typeface="Calibri"/>
-                        <a:sym typeface="Calibri"/>
-                      </a:endParaRPr>
-                    </a:p>
-                  </a:txBody>
-                  <a:tcPr marL="40925" marR="40925" marT="0" marB="0"/>
-                </a:tc>
-                <a:tc>
-                  <a:txBody>
-                    <a:bodyPr/>
-                    <a:lstStyle/>
-                    <a:p>
-                      <a:pPr marL="0" marR="0" lvl="0" indent="0" algn="l" rtl="0">
-                        <a:lnSpc>
-                          <a:spcPct val="115000"/>
-                        </a:lnSpc>
-                        <a:spcBef>
-                          <a:spcPts val="0"/>
-                        </a:spcBef>
-                        <a:spcAft>
-                          <a:spcPts val="0"/>
-                        </a:spcAft>
-                        <a:buNone/>
-                      </a:pPr>
-                      <a:r>
-                        <a:rPr lang="en-US" sz="1200" u="none" strike="noStrike" cap="none"/>
-                        <a:t>Raster</a:t>
-                      </a:r>
-                      <a:endParaRPr sz="1100" u="none" strike="noStrike" cap="none">
-                        <a:latin typeface="Calibri"/>
-                        <a:ea typeface="Calibri"/>
-                        <a:cs typeface="Calibri"/>
-                        <a:sym typeface="Calibri"/>
-                      </a:endParaRPr>
-                    </a:p>
-                  </a:txBody>
-                  <a:tcPr marL="40925" marR="40925" marT="0" marB="0"/>
-                </a:tc>
-                <a:tc>
-                  <a:txBody>
-                    <a:bodyPr/>
-                    <a:lstStyle/>
-                    <a:p>
-                      <a:pPr marL="0" marR="0" lvl="0" indent="0" algn="l" rtl="0">
-                        <a:lnSpc>
-                          <a:spcPct val="115000"/>
-                        </a:lnSpc>
-                        <a:spcBef>
-                          <a:spcPts val="0"/>
-                        </a:spcBef>
-                        <a:spcAft>
-                          <a:spcPts val="0"/>
-                        </a:spcAft>
-                        <a:buNone/>
-                      </a:pPr>
-                      <a:r>
-                        <a:rPr lang="en-US" sz="1200" u="none" strike="noStrike" cap="none"/>
-                        <a:t>30m</a:t>
-                      </a:r>
-                      <a:endParaRPr sz="1100" u="none" strike="noStrike" cap="none">
-                        <a:latin typeface="Calibri"/>
-                        <a:ea typeface="Calibri"/>
-                        <a:cs typeface="Calibri"/>
-                        <a:sym typeface="Calibri"/>
-                      </a:endParaRPr>
-                    </a:p>
-                  </a:txBody>
-                  <a:tcPr marL="40925" marR="40925" marT="0" marB="0"/>
-                </a:tc>
-                <a:tc>
-                  <a:txBody>
-                    <a:bodyPr/>
-                    <a:lstStyle/>
-                    <a:p>
-                      <a:pPr marL="0" marR="0" lvl="0" indent="0" algn="l" rtl="0">
-                        <a:lnSpc>
-                          <a:spcPct val="115000"/>
-                        </a:lnSpc>
-                        <a:spcBef>
-                          <a:spcPts val="0"/>
-                        </a:spcBef>
-                        <a:spcAft>
-                          <a:spcPts val="0"/>
-                        </a:spcAft>
-                        <a:buNone/>
-                      </a:pPr>
-                      <a:r>
-                        <a:rPr lang="en-US" sz="1200" u="none" strike="noStrike" cap="none"/>
-                        <a:t>https://www.mrlc.gov/nlcd2006.php</a:t>
-                      </a:r>
-                      <a:endParaRPr sz="1100" u="none" strike="noStrike" cap="none"/>
-                    </a:p>
-                  </a:txBody>
-                  <a:tcPr marL="40925" marR="40925" marT="0" marB="0"/>
-                </a:tc>
-                <a:extLst>
-                  <a:ext uri="{0D108BD9-81ED-4DB2-BD59-A6C34878D82A}">
-                    <a16:rowId xmlns:a16="http://schemas.microsoft.com/office/drawing/2014/main" val="10002"/>
-                  </a:ext>
-                </a:extLst>
-              </a:tr>
-              <a:tr h="500050">
-                <a:tc>
-                  <a:txBody>
-                    <a:bodyPr/>
-                    <a:lstStyle/>
-                    <a:p>
-                      <a:pPr marL="0" marR="0" lvl="0" indent="0" algn="l" rtl="0">
-                        <a:lnSpc>
-                          <a:spcPct val="115000"/>
-                        </a:lnSpc>
-                        <a:spcBef>
-                          <a:spcPts val="0"/>
-                        </a:spcBef>
-                        <a:spcAft>
-                          <a:spcPts val="0"/>
-                        </a:spcAft>
-                        <a:buNone/>
-                      </a:pPr>
-                      <a:r>
-                        <a:rPr lang="en-US" sz="1200" u="none" strike="noStrike" cap="none"/>
-                        <a:t>Land cover 2011</a:t>
-                      </a:r>
-                      <a:endParaRPr sz="1100" u="none" strike="noStrike" cap="none">
-                        <a:latin typeface="Calibri"/>
-                        <a:ea typeface="Calibri"/>
-                        <a:cs typeface="Calibri"/>
-                        <a:sym typeface="Calibri"/>
-                      </a:endParaRPr>
-                    </a:p>
-                  </a:txBody>
-                  <a:tcPr marL="40925" marR="40925" marT="0" marB="0"/>
-                </a:tc>
-                <a:tc>
-                  <a:txBody>
-                    <a:bodyPr/>
-                    <a:lstStyle/>
-                    <a:p>
-                      <a:pPr marL="0" marR="0" lvl="0" indent="0" algn="l" rtl="0">
-                        <a:lnSpc>
-                          <a:spcPct val="115000"/>
-                        </a:lnSpc>
-                        <a:spcBef>
-                          <a:spcPts val="0"/>
-                        </a:spcBef>
-                        <a:spcAft>
-                          <a:spcPts val="0"/>
-                        </a:spcAft>
-                        <a:buNone/>
-                      </a:pPr>
-                      <a:r>
-                        <a:rPr lang="en-US" sz="1200" u="none" strike="noStrike" cap="none"/>
-                        <a:t>Raster</a:t>
-                      </a:r>
-                      <a:endParaRPr sz="1100" u="none" strike="noStrike" cap="none">
-                        <a:latin typeface="Calibri"/>
-                        <a:ea typeface="Calibri"/>
-                        <a:cs typeface="Calibri"/>
-                        <a:sym typeface="Calibri"/>
-                      </a:endParaRPr>
-                    </a:p>
-                  </a:txBody>
-                  <a:tcPr marL="40925" marR="40925" marT="0" marB="0"/>
-                </a:tc>
-                <a:tc>
-                  <a:txBody>
-                    <a:bodyPr/>
-                    <a:lstStyle/>
-                    <a:p>
-                      <a:pPr marL="0" marR="0" lvl="0" indent="0" algn="l" rtl="0">
-                        <a:lnSpc>
-                          <a:spcPct val="115000"/>
-                        </a:lnSpc>
-                        <a:spcBef>
-                          <a:spcPts val="0"/>
-                        </a:spcBef>
-                        <a:spcAft>
-                          <a:spcPts val="0"/>
-                        </a:spcAft>
-                        <a:buNone/>
-                      </a:pPr>
-                      <a:r>
-                        <a:rPr lang="en-US" sz="1200" u="none" strike="noStrike" cap="none"/>
-                        <a:t>30m</a:t>
-                      </a:r>
-                      <a:endParaRPr sz="1100" u="none" strike="noStrike" cap="none">
-                        <a:latin typeface="Calibri"/>
-                        <a:ea typeface="Calibri"/>
-                        <a:cs typeface="Calibri"/>
-                        <a:sym typeface="Calibri"/>
-                      </a:endParaRPr>
-                    </a:p>
-                  </a:txBody>
-                  <a:tcPr marL="40925" marR="40925" marT="0" marB="0"/>
-                </a:tc>
-                <a:tc>
-                  <a:txBody>
-                    <a:bodyPr/>
-                    <a:lstStyle/>
-                    <a:p>
-                      <a:pPr marL="0" marR="0" lvl="0" indent="0" algn="l" rtl="0">
-                        <a:lnSpc>
-                          <a:spcPct val="115000"/>
-                        </a:lnSpc>
-                        <a:spcBef>
-                          <a:spcPts val="0"/>
-                        </a:spcBef>
-                        <a:spcAft>
-                          <a:spcPts val="0"/>
-                        </a:spcAft>
-                        <a:buNone/>
-                      </a:pPr>
-                      <a:r>
-                        <a:rPr lang="en-US" sz="1200" u="none" strike="noStrike" cap="none"/>
-                        <a:t>https://www.mrlc.gov/nlcd2011.php</a:t>
-                      </a:r>
-                      <a:endParaRPr sz="1100" u="none" strike="noStrike" cap="none"/>
-                    </a:p>
-                  </a:txBody>
-                  <a:tcPr marL="40925" marR="40925" marT="0" marB="0"/>
-                </a:tc>
-                <a:extLst>
-                  <a:ext uri="{0D108BD9-81ED-4DB2-BD59-A6C34878D82A}">
-                    <a16:rowId xmlns:a16="http://schemas.microsoft.com/office/drawing/2014/main" val="10003"/>
-                  </a:ext>
-                </a:extLst>
-              </a:tr>
-              <a:tr h="329725">
-                <a:tc>
-                  <a:txBody>
-                    <a:bodyPr/>
-                    <a:lstStyle/>
-                    <a:p>
-                      <a:pPr marL="0" marR="0" lvl="0" indent="0" algn="l" rtl="0">
-                        <a:lnSpc>
-                          <a:spcPct val="115000"/>
-                        </a:lnSpc>
-                        <a:spcBef>
-                          <a:spcPts val="0"/>
-                        </a:spcBef>
-                        <a:spcAft>
-                          <a:spcPts val="0"/>
-                        </a:spcAft>
-                        <a:buNone/>
-                      </a:pPr>
-                      <a:r>
-                        <a:rPr lang="en-US" sz="1200" u="none" strike="noStrike" cap="none"/>
-                        <a:t>Urban areas</a:t>
-                      </a:r>
-                      <a:endParaRPr sz="1100" u="none" strike="noStrike" cap="none">
-                        <a:latin typeface="Calibri"/>
-                        <a:ea typeface="Calibri"/>
-                        <a:cs typeface="Calibri"/>
-                        <a:sym typeface="Calibri"/>
-                      </a:endParaRPr>
-                    </a:p>
-                  </a:txBody>
-                  <a:tcPr marL="40925" marR="40925" marT="0" marB="0"/>
-                </a:tc>
-                <a:tc>
-                  <a:txBody>
-                    <a:bodyPr/>
-                    <a:lstStyle/>
-                    <a:p>
-                      <a:pPr marL="0" marR="0" lvl="0" indent="0" algn="l" rtl="0">
-                        <a:lnSpc>
-                          <a:spcPct val="115000"/>
-                        </a:lnSpc>
-                        <a:spcBef>
-                          <a:spcPts val="0"/>
-                        </a:spcBef>
-                        <a:spcAft>
-                          <a:spcPts val="0"/>
-                        </a:spcAft>
-                        <a:buNone/>
-                      </a:pPr>
-                      <a:r>
-                        <a:rPr lang="en-US" sz="1200" u="none" strike="noStrike" cap="none"/>
-                        <a:t>Raster</a:t>
-                      </a:r>
-                      <a:endParaRPr sz="1100" u="none" strike="noStrike" cap="none">
-                        <a:latin typeface="Calibri"/>
-                        <a:ea typeface="Calibri"/>
-                        <a:cs typeface="Calibri"/>
-                        <a:sym typeface="Calibri"/>
-                      </a:endParaRPr>
-                    </a:p>
-                  </a:txBody>
-                  <a:tcPr marL="40925" marR="40925" marT="0" marB="0"/>
-                </a:tc>
-                <a:tc>
-                  <a:txBody>
-                    <a:bodyPr/>
-                    <a:lstStyle/>
-                    <a:p>
-                      <a:pPr marL="0" marR="0" lvl="0" indent="0" algn="l" rtl="0">
-                        <a:lnSpc>
-                          <a:spcPct val="115000"/>
-                        </a:lnSpc>
-                        <a:spcBef>
-                          <a:spcPts val="0"/>
-                        </a:spcBef>
-                        <a:spcAft>
-                          <a:spcPts val="0"/>
-                        </a:spcAft>
-                        <a:buNone/>
-                      </a:pPr>
-                      <a:r>
-                        <a:rPr lang="en-US" sz="1200" u="none" strike="noStrike" cap="none"/>
-                        <a:t>30m</a:t>
-                      </a:r>
-                      <a:endParaRPr sz="1100" u="none" strike="noStrike" cap="none">
-                        <a:latin typeface="Calibri"/>
-                        <a:ea typeface="Calibri"/>
-                        <a:cs typeface="Calibri"/>
-                        <a:sym typeface="Calibri"/>
-                      </a:endParaRPr>
-                    </a:p>
-                  </a:txBody>
-                  <a:tcPr marL="40925" marR="40925" marT="0" marB="0"/>
-                </a:tc>
-                <a:tc>
-                  <a:txBody>
-                    <a:bodyPr/>
-                    <a:lstStyle/>
-                    <a:p>
-                      <a:pPr marL="0" marR="0" lvl="0" indent="0" algn="l" rtl="0">
-                        <a:lnSpc>
-                          <a:spcPct val="115000"/>
-                        </a:lnSpc>
-                        <a:spcBef>
-                          <a:spcPts val="0"/>
-                        </a:spcBef>
-                        <a:spcAft>
-                          <a:spcPts val="0"/>
-                        </a:spcAft>
-                        <a:buNone/>
-                      </a:pPr>
-                      <a:r>
-                        <a:rPr lang="en-US" sz="1200" u="none" strike="noStrike" cap="none"/>
-                        <a:t>Extracted from land cover for the processing date.</a:t>
-                      </a:r>
-                      <a:endParaRPr sz="1100" u="none" strike="noStrike" cap="none">
-                        <a:latin typeface="Calibri"/>
-                        <a:ea typeface="Calibri"/>
-                        <a:cs typeface="Calibri"/>
-                        <a:sym typeface="Calibri"/>
-                      </a:endParaRPr>
-                    </a:p>
-                  </a:txBody>
-                  <a:tcPr marL="40925" marR="40925" marT="0" marB="0"/>
-                </a:tc>
-                <a:extLst>
-                  <a:ext uri="{0D108BD9-81ED-4DB2-BD59-A6C34878D82A}">
-                    <a16:rowId xmlns:a16="http://schemas.microsoft.com/office/drawing/2014/main" val="10004"/>
-                  </a:ext>
-                </a:extLst>
-              </a:tr>
-              <a:tr h="787625">
-                <a:tc>
-                  <a:txBody>
-                    <a:bodyPr/>
-                    <a:lstStyle/>
-                    <a:p>
-                      <a:pPr marL="0" marR="0" lvl="0" indent="0" algn="l" rtl="0">
-                        <a:lnSpc>
-                          <a:spcPct val="115000"/>
-                        </a:lnSpc>
-                        <a:spcBef>
-                          <a:spcPts val="0"/>
-                        </a:spcBef>
-                        <a:spcAft>
-                          <a:spcPts val="0"/>
-                        </a:spcAft>
-                        <a:buNone/>
-                      </a:pPr>
-                      <a:r>
-                        <a:rPr lang="en-US" sz="1200" u="none" strike="noStrike" cap="none"/>
-                        <a:t>Conservation areas</a:t>
-                      </a:r>
-                      <a:endParaRPr sz="1100" u="none" strike="noStrike" cap="none">
-                        <a:latin typeface="Calibri"/>
-                        <a:ea typeface="Calibri"/>
-                        <a:cs typeface="Calibri"/>
-                        <a:sym typeface="Calibri"/>
-                      </a:endParaRPr>
-                    </a:p>
-                  </a:txBody>
-                  <a:tcPr marL="40925" marR="40925" marT="0" marB="0"/>
-                </a:tc>
-                <a:tc>
-                  <a:txBody>
-                    <a:bodyPr/>
-                    <a:lstStyle/>
-                    <a:p>
-                      <a:pPr marL="0" marR="0" lvl="0" indent="0" algn="l" rtl="0">
-                        <a:lnSpc>
-                          <a:spcPct val="115000"/>
-                        </a:lnSpc>
-                        <a:spcBef>
-                          <a:spcPts val="0"/>
-                        </a:spcBef>
-                        <a:spcAft>
-                          <a:spcPts val="0"/>
-                        </a:spcAft>
-                        <a:buNone/>
-                      </a:pPr>
-                      <a:r>
-                        <a:rPr lang="en-US" sz="1200" u="none" strike="noStrike" cap="none"/>
-                        <a:t>Polygon</a:t>
-                      </a:r>
-                      <a:endParaRPr sz="1100" u="none" strike="noStrike" cap="none">
-                        <a:latin typeface="Calibri"/>
-                        <a:ea typeface="Calibri"/>
-                        <a:cs typeface="Calibri"/>
-                        <a:sym typeface="Calibri"/>
-                      </a:endParaRPr>
-                    </a:p>
-                  </a:txBody>
-                  <a:tcPr marL="40925" marR="40925" marT="0" marB="0"/>
-                </a:tc>
-                <a:tc>
-                  <a:txBody>
-                    <a:bodyPr/>
-                    <a:lstStyle/>
-                    <a:p>
-                      <a:pPr marL="0" marR="0" lvl="0" indent="0" algn="l" rtl="0">
-                        <a:lnSpc>
-                          <a:spcPct val="115000"/>
-                        </a:lnSpc>
-                        <a:spcBef>
-                          <a:spcPts val="0"/>
-                        </a:spcBef>
-                        <a:spcAft>
-                          <a:spcPts val="0"/>
-                        </a:spcAft>
-                        <a:buNone/>
-                      </a:pPr>
-                      <a:r>
-                        <a:rPr lang="en-US" sz="1200" u="none" strike="noStrike" cap="none"/>
-                        <a:t>--</a:t>
-                      </a:r>
-                      <a:endParaRPr sz="1100" u="none" strike="noStrike" cap="none">
-                        <a:latin typeface="Calibri"/>
-                        <a:ea typeface="Calibri"/>
-                        <a:cs typeface="Calibri"/>
-                        <a:sym typeface="Calibri"/>
-                      </a:endParaRPr>
-                    </a:p>
-                  </a:txBody>
-                  <a:tcPr marL="40925" marR="40925" marT="0" marB="0"/>
-                </a:tc>
-                <a:tc>
-                  <a:txBody>
-                    <a:bodyPr/>
-                    <a:lstStyle/>
-                    <a:p>
-                      <a:pPr marL="0" marR="0" lvl="0" indent="0" algn="l" rtl="0">
-                        <a:lnSpc>
-                          <a:spcPct val="115000"/>
-                        </a:lnSpc>
-                        <a:spcBef>
-                          <a:spcPts val="0"/>
-                        </a:spcBef>
-                        <a:spcAft>
-                          <a:spcPts val="0"/>
-                        </a:spcAft>
-                        <a:buNone/>
-                      </a:pPr>
-                      <a:r>
-                        <a:rPr lang="en-US" sz="1200" b="0" i="0" u="none" strike="noStrike" cap="none">
-                          <a:solidFill>
-                            <a:schemeClr val="dk1"/>
-                          </a:solidFill>
-                          <a:latin typeface="Arial"/>
-                          <a:ea typeface="Arial"/>
-                          <a:cs typeface="Arial"/>
-                          <a:sym typeface="Arial"/>
-                        </a:rPr>
-                        <a:t>State Lands Habitat Conservation Plan (HCP), 1997</a:t>
-                      </a:r>
-                      <a:endParaRPr/>
-                    </a:p>
-                    <a:p>
-                      <a:pPr marL="0" marR="0" lvl="0" indent="0" algn="l" rtl="0">
-                        <a:lnSpc>
-                          <a:spcPct val="115000"/>
-                        </a:lnSpc>
-                        <a:spcBef>
-                          <a:spcPts val="0"/>
-                        </a:spcBef>
-                        <a:spcAft>
-                          <a:spcPts val="0"/>
-                        </a:spcAft>
-                        <a:buNone/>
-                      </a:pPr>
-                      <a:r>
-                        <a:rPr lang="en-US" sz="1200" b="0" i="0" u="none" strike="noStrike" cap="none">
-                          <a:solidFill>
-                            <a:schemeClr val="dk1"/>
-                          </a:solidFill>
-                          <a:latin typeface="Arial"/>
-                          <a:ea typeface="Arial"/>
-                          <a:cs typeface="Arial"/>
-                          <a:sym typeface="Arial"/>
-                        </a:rPr>
-                        <a:t>http://data-wadnr.opendata.arcgis.com/datasets/habitat-conservation-plan-lands</a:t>
-                      </a:r>
-                      <a:endParaRPr/>
-                    </a:p>
-                  </a:txBody>
-                  <a:tcPr marL="40925" marR="40925" marT="0" marB="0"/>
-                </a:tc>
-                <a:extLst>
-                  <a:ext uri="{0D108BD9-81ED-4DB2-BD59-A6C34878D82A}">
-                    <a16:rowId xmlns:a16="http://schemas.microsoft.com/office/drawing/2014/main" val="10005"/>
-                  </a:ext>
-                </a:extLst>
-              </a:tr>
-              <a:tr h="1558375">
-                <a:tc>
-                  <a:txBody>
-                    <a:bodyPr/>
-                    <a:lstStyle/>
-                    <a:p>
-                      <a:pPr marL="0" marR="0" lvl="0" indent="0" algn="l" rtl="0">
-                        <a:lnSpc>
-                          <a:spcPct val="115000"/>
-                        </a:lnSpc>
-                        <a:spcBef>
-                          <a:spcPts val="0"/>
-                        </a:spcBef>
-                        <a:spcAft>
-                          <a:spcPts val="0"/>
-                        </a:spcAft>
-                        <a:buNone/>
-                      </a:pPr>
-                      <a:r>
-                        <a:rPr lang="en-US" sz="1200" u="none" strike="noStrike" cap="none"/>
-                        <a:t>State and Local streets</a:t>
-                      </a:r>
-                      <a:endParaRPr sz="1100" u="none" strike="noStrike" cap="none">
-                        <a:latin typeface="Calibri"/>
-                        <a:ea typeface="Calibri"/>
-                        <a:cs typeface="Calibri"/>
-                        <a:sym typeface="Calibri"/>
-                      </a:endParaRPr>
-                    </a:p>
-                  </a:txBody>
-                  <a:tcPr marL="40925" marR="40925" marT="0" marB="0"/>
-                </a:tc>
-                <a:tc>
-                  <a:txBody>
-                    <a:bodyPr/>
-                    <a:lstStyle/>
-                    <a:p>
-                      <a:pPr marL="0" marR="0" lvl="0" indent="0" algn="l" rtl="0">
-                        <a:lnSpc>
-                          <a:spcPct val="115000"/>
-                        </a:lnSpc>
-                        <a:spcBef>
-                          <a:spcPts val="0"/>
-                        </a:spcBef>
-                        <a:spcAft>
-                          <a:spcPts val="0"/>
-                        </a:spcAft>
-                        <a:buNone/>
-                      </a:pPr>
-                      <a:r>
-                        <a:rPr lang="en-US" sz="1200" u="none" strike="noStrike" cap="none"/>
-                        <a:t>Lines</a:t>
-                      </a:r>
-                      <a:endParaRPr sz="1100" u="none" strike="noStrike" cap="none">
-                        <a:latin typeface="Calibri"/>
-                        <a:ea typeface="Calibri"/>
-                        <a:cs typeface="Calibri"/>
-                        <a:sym typeface="Calibri"/>
-                      </a:endParaRPr>
-                    </a:p>
-                  </a:txBody>
-                  <a:tcPr marL="40925" marR="40925" marT="0" marB="0"/>
-                </a:tc>
-                <a:tc>
-                  <a:txBody>
-                    <a:bodyPr/>
-                    <a:lstStyle/>
-                    <a:p>
-                      <a:pPr marL="0" marR="0" lvl="0" indent="0" algn="l" rtl="0">
-                        <a:lnSpc>
-                          <a:spcPct val="115000"/>
-                        </a:lnSpc>
-                        <a:spcBef>
-                          <a:spcPts val="0"/>
-                        </a:spcBef>
-                        <a:spcAft>
-                          <a:spcPts val="0"/>
-                        </a:spcAft>
-                        <a:buNone/>
-                      </a:pPr>
-                      <a:r>
-                        <a:rPr lang="en-US" sz="1200" u="none" strike="noStrike" cap="none"/>
-                        <a:t>--</a:t>
-                      </a:r>
-                      <a:endParaRPr sz="1100" u="none" strike="noStrike" cap="none">
-                        <a:latin typeface="Calibri"/>
-                        <a:ea typeface="Calibri"/>
-                        <a:cs typeface="Calibri"/>
-                        <a:sym typeface="Calibri"/>
-                      </a:endParaRPr>
-                    </a:p>
-                  </a:txBody>
-                  <a:tcPr marL="40925" marR="40925" marT="0" marB="0"/>
-                </a:tc>
-                <a:tc>
-                  <a:txBody>
-                    <a:bodyPr/>
-                    <a:lstStyle/>
-                    <a:p>
-                      <a:pPr marL="0" marR="0" lvl="0" indent="0" algn="l" rtl="0">
-                        <a:lnSpc>
-                          <a:spcPct val="115000"/>
-                        </a:lnSpc>
-                        <a:spcBef>
-                          <a:spcPts val="0"/>
-                        </a:spcBef>
-                        <a:spcAft>
-                          <a:spcPts val="0"/>
-                        </a:spcAft>
-                        <a:buNone/>
-                      </a:pPr>
-                      <a:r>
-                        <a:rPr lang="en-US" sz="1200" b="0" i="0" u="none" strike="noStrike" cap="none">
-                          <a:solidFill>
-                            <a:schemeClr val="dk1"/>
-                          </a:solidFill>
-                          <a:latin typeface="Arial"/>
-                          <a:ea typeface="Arial"/>
-                          <a:cs typeface="Arial"/>
-                          <a:sym typeface="Arial"/>
-                        </a:rPr>
-                        <a:t>WSDOT, 2006</a:t>
-                      </a:r>
-                      <a:endParaRPr/>
-                    </a:p>
-                    <a:p>
-                      <a:pPr marL="0" marR="0" lvl="0" indent="0" algn="l" rtl="0">
-                        <a:lnSpc>
-                          <a:spcPct val="115000"/>
-                        </a:lnSpc>
-                        <a:spcBef>
-                          <a:spcPts val="0"/>
-                        </a:spcBef>
-                        <a:spcAft>
-                          <a:spcPts val="0"/>
-                        </a:spcAft>
-                        <a:buNone/>
-                      </a:pPr>
-                      <a:r>
-                        <a:rPr lang="en-US" sz="1200" b="0" i="0" u="none" strike="noStrike" cap="none">
-                          <a:solidFill>
-                            <a:schemeClr val="dk1"/>
-                          </a:solidFill>
-                          <a:latin typeface="Arial"/>
-                          <a:ea typeface="Arial"/>
-                          <a:cs typeface="Arial"/>
-                          <a:sym typeface="Arial"/>
-                        </a:rPr>
-                        <a:t>National Highway System – Local roads, 2006</a:t>
-                      </a:r>
-                      <a:endParaRPr/>
-                    </a:p>
-                    <a:p>
-                      <a:pPr marL="0" marR="0" lvl="0" indent="0" algn="l" rtl="0">
-                        <a:lnSpc>
-                          <a:spcPct val="115000"/>
-                        </a:lnSpc>
-                        <a:spcBef>
-                          <a:spcPts val="0"/>
-                        </a:spcBef>
-                        <a:spcAft>
-                          <a:spcPts val="0"/>
-                        </a:spcAft>
-                        <a:buNone/>
-                      </a:pPr>
-                      <a:r>
-                        <a:rPr lang="en-US" sz="1200" b="0" i="0" u="none" strike="noStrike" cap="none">
-                          <a:solidFill>
-                            <a:schemeClr val="dk1"/>
-                          </a:solidFill>
-                          <a:latin typeface="Arial"/>
-                          <a:ea typeface="Arial"/>
-                          <a:cs typeface="Arial"/>
-                          <a:sym typeface="Arial"/>
-                        </a:rPr>
-                        <a:t>http://www.wsdot.wa.gov/mapsdata/geodatacatalog/Maps/noscale/DOT_TDO/NHS/NHSGIF.htm</a:t>
-                      </a:r>
-                      <a:endParaRPr/>
-                    </a:p>
-                    <a:p>
-                      <a:pPr marL="0" marR="0" lvl="0" indent="0" algn="l" rtl="0">
-                        <a:lnSpc>
-                          <a:spcPct val="115000"/>
-                        </a:lnSpc>
-                        <a:spcBef>
-                          <a:spcPts val="0"/>
-                        </a:spcBef>
-                        <a:spcAft>
-                          <a:spcPts val="0"/>
-                        </a:spcAft>
-                        <a:buNone/>
-                      </a:pPr>
-                      <a:r>
-                        <a:rPr lang="en-US" sz="1200" b="0" i="0" u="none" strike="noStrike" cap="none">
-                          <a:solidFill>
-                            <a:schemeClr val="dk1"/>
-                          </a:solidFill>
-                          <a:latin typeface="Arial"/>
-                          <a:ea typeface="Arial"/>
-                          <a:cs typeface="Arial"/>
-                          <a:sym typeface="Arial"/>
-                        </a:rPr>
-                        <a:t>National Highway System – State roads, 2006</a:t>
-                      </a:r>
-                      <a:endParaRPr/>
-                    </a:p>
-                    <a:p>
-                      <a:pPr marL="0" marR="0" lvl="0" indent="0" algn="l" rtl="0">
-                        <a:lnSpc>
-                          <a:spcPct val="115000"/>
-                        </a:lnSpc>
-                        <a:spcBef>
-                          <a:spcPts val="0"/>
-                        </a:spcBef>
-                        <a:spcAft>
-                          <a:spcPts val="0"/>
-                        </a:spcAft>
-                        <a:buNone/>
-                      </a:pPr>
-                      <a:r>
-                        <a:rPr lang="en-US" sz="1200" b="0" i="0" u="none" strike="noStrike" cap="none">
-                          <a:solidFill>
-                            <a:schemeClr val="dk1"/>
-                          </a:solidFill>
-                          <a:latin typeface="Arial"/>
-                          <a:ea typeface="Arial"/>
-                          <a:cs typeface="Arial"/>
-                          <a:sym typeface="Arial"/>
-                        </a:rPr>
-                        <a:t>http://www.wsdot.wa.gov/mapsdata/geodatacatalog/Maps/noscale/DOT_TDO/NHS/NHSGIF.htm</a:t>
-                      </a:r>
-                      <a:endParaRPr/>
-                    </a:p>
-                  </a:txBody>
-                  <a:tcPr marL="40925" marR="40925" marT="0" marB="0"/>
-                </a:tc>
-                <a:extLst>
-                  <a:ext uri="{0D108BD9-81ED-4DB2-BD59-A6C34878D82A}">
-                    <a16:rowId xmlns:a16="http://schemas.microsoft.com/office/drawing/2014/main" val="10006"/>
-                  </a:ext>
-                </a:extLst>
-              </a:tr>
-              <a:tr h="329725">
-                <a:tc>
-                  <a:txBody>
-                    <a:bodyPr/>
-                    <a:lstStyle/>
-                    <a:p>
-                      <a:pPr marL="0" marR="0" lvl="0" indent="0" algn="l" rtl="0">
-                        <a:lnSpc>
-                          <a:spcPct val="115000"/>
-                        </a:lnSpc>
-                        <a:spcBef>
-                          <a:spcPts val="0"/>
-                        </a:spcBef>
-                        <a:spcAft>
-                          <a:spcPts val="0"/>
-                        </a:spcAft>
-                        <a:buNone/>
-                      </a:pPr>
-                      <a:r>
-                        <a:rPr lang="en-US" sz="1200" u="none" strike="noStrike" cap="none"/>
-                        <a:t>Open water</a:t>
-                      </a:r>
-                      <a:endParaRPr sz="1100" u="none" strike="noStrike" cap="none">
-                        <a:latin typeface="Calibri"/>
-                        <a:ea typeface="Calibri"/>
-                        <a:cs typeface="Calibri"/>
-                        <a:sym typeface="Calibri"/>
-                      </a:endParaRPr>
-                    </a:p>
-                  </a:txBody>
-                  <a:tcPr marL="40925" marR="40925" marT="0" marB="0"/>
-                </a:tc>
-                <a:tc>
-                  <a:txBody>
-                    <a:bodyPr/>
-                    <a:lstStyle/>
-                    <a:p>
-                      <a:pPr marL="0" marR="0" lvl="0" indent="0" algn="l" rtl="0">
-                        <a:lnSpc>
-                          <a:spcPct val="115000"/>
-                        </a:lnSpc>
-                        <a:spcBef>
-                          <a:spcPts val="0"/>
-                        </a:spcBef>
-                        <a:spcAft>
-                          <a:spcPts val="0"/>
-                        </a:spcAft>
-                        <a:buNone/>
-                      </a:pPr>
-                      <a:r>
-                        <a:rPr lang="en-US" sz="1200" u="none" strike="noStrike" cap="none"/>
-                        <a:t>Raster</a:t>
-                      </a:r>
-                      <a:endParaRPr sz="1100" u="none" strike="noStrike" cap="none">
-                        <a:latin typeface="Calibri"/>
-                        <a:ea typeface="Calibri"/>
-                        <a:cs typeface="Calibri"/>
-                        <a:sym typeface="Calibri"/>
-                      </a:endParaRPr>
-                    </a:p>
-                  </a:txBody>
-                  <a:tcPr marL="40925" marR="40925" marT="0" marB="0"/>
-                </a:tc>
-                <a:tc>
-                  <a:txBody>
-                    <a:bodyPr/>
-                    <a:lstStyle/>
-                    <a:p>
-                      <a:pPr marL="0" marR="0" lvl="0" indent="0" algn="l" rtl="0">
-                        <a:lnSpc>
-                          <a:spcPct val="115000"/>
-                        </a:lnSpc>
-                        <a:spcBef>
-                          <a:spcPts val="0"/>
-                        </a:spcBef>
-                        <a:spcAft>
-                          <a:spcPts val="0"/>
-                        </a:spcAft>
-                        <a:buNone/>
-                      </a:pPr>
-                      <a:r>
-                        <a:rPr lang="en-US" sz="1200" u="none" strike="noStrike" cap="none"/>
-                        <a:t>30m</a:t>
-                      </a:r>
-                      <a:endParaRPr sz="1100" u="none" strike="noStrike" cap="none">
-                        <a:latin typeface="Calibri"/>
-                        <a:ea typeface="Calibri"/>
-                        <a:cs typeface="Calibri"/>
-                        <a:sym typeface="Calibri"/>
-                      </a:endParaRPr>
-                    </a:p>
-                  </a:txBody>
-                  <a:tcPr marL="40925" marR="40925" marT="0" marB="0"/>
-                </a:tc>
-                <a:tc>
-                  <a:txBody>
-                    <a:bodyPr/>
-                    <a:lstStyle/>
-                    <a:p>
-                      <a:pPr marL="0" marR="0" lvl="0" indent="0" algn="l" rtl="0">
-                        <a:lnSpc>
-                          <a:spcPct val="115000"/>
-                        </a:lnSpc>
-                        <a:spcBef>
-                          <a:spcPts val="0"/>
-                        </a:spcBef>
-                        <a:spcAft>
-                          <a:spcPts val="0"/>
-                        </a:spcAft>
-                        <a:buNone/>
-                      </a:pPr>
-                      <a:r>
-                        <a:rPr lang="en-US" sz="1200" u="none" strike="noStrike" cap="none"/>
-                        <a:t>Extracted from land cover for the processing date.</a:t>
-                      </a:r>
-                      <a:endParaRPr sz="1100" u="none" strike="noStrike" cap="none">
-                        <a:latin typeface="Calibri"/>
-                        <a:ea typeface="Calibri"/>
-                        <a:cs typeface="Calibri"/>
-                        <a:sym typeface="Calibri"/>
-                      </a:endParaRPr>
-                    </a:p>
-                  </a:txBody>
-                  <a:tcPr marL="40925" marR="40925" marT="0" marB="0"/>
-                </a:tc>
-                <a:extLst>
-                  <a:ext uri="{0D108BD9-81ED-4DB2-BD59-A6C34878D82A}">
-                    <a16:rowId xmlns:a16="http://schemas.microsoft.com/office/drawing/2014/main" val="10007"/>
-                  </a:ext>
-                </a:extLst>
-              </a:tr>
-              <a:tr h="256975">
-                <a:tc>
-                  <a:txBody>
-                    <a:bodyPr/>
-                    <a:lstStyle/>
-                    <a:p>
-                      <a:pPr marL="0" marR="0" lvl="0" indent="0" algn="l" rtl="0">
-                        <a:lnSpc>
-                          <a:spcPct val="115000"/>
-                        </a:lnSpc>
-                        <a:spcBef>
-                          <a:spcPts val="0"/>
-                        </a:spcBef>
-                        <a:spcAft>
-                          <a:spcPts val="0"/>
-                        </a:spcAft>
-                        <a:buNone/>
-                      </a:pPr>
-                      <a:r>
-                        <a:rPr lang="en-US" sz="1200" u="none" strike="noStrike" cap="none"/>
-                        <a:t>Wetlands</a:t>
-                      </a:r>
-                      <a:endParaRPr sz="1100" u="none" strike="noStrike" cap="none">
-                        <a:latin typeface="Calibri"/>
-                        <a:ea typeface="Calibri"/>
-                        <a:cs typeface="Calibri"/>
-                        <a:sym typeface="Calibri"/>
-                      </a:endParaRPr>
-                    </a:p>
-                  </a:txBody>
-                  <a:tcPr marL="40925" marR="40925" marT="0" marB="0"/>
-                </a:tc>
-                <a:tc>
-                  <a:txBody>
-                    <a:bodyPr/>
-                    <a:lstStyle/>
-                    <a:p>
-                      <a:pPr marL="0" marR="0" lvl="0" indent="0" algn="l" rtl="0">
-                        <a:lnSpc>
-                          <a:spcPct val="115000"/>
-                        </a:lnSpc>
-                        <a:spcBef>
-                          <a:spcPts val="0"/>
-                        </a:spcBef>
-                        <a:spcAft>
-                          <a:spcPts val="0"/>
-                        </a:spcAft>
-                        <a:buNone/>
-                      </a:pPr>
-                      <a:r>
-                        <a:rPr lang="en-US" sz="1200" u="none" strike="noStrike" cap="none"/>
-                        <a:t>Raster</a:t>
-                      </a:r>
-                      <a:endParaRPr sz="1100" u="none" strike="noStrike" cap="none">
-                        <a:latin typeface="Calibri"/>
-                        <a:ea typeface="Calibri"/>
-                        <a:cs typeface="Calibri"/>
-                        <a:sym typeface="Calibri"/>
-                      </a:endParaRPr>
-                    </a:p>
-                  </a:txBody>
-                  <a:tcPr marL="40925" marR="40925" marT="0" marB="0"/>
-                </a:tc>
-                <a:tc>
-                  <a:txBody>
-                    <a:bodyPr/>
-                    <a:lstStyle/>
-                    <a:p>
-                      <a:pPr marL="0" marR="0" lvl="0" indent="0" algn="l" rtl="0">
-                        <a:lnSpc>
-                          <a:spcPct val="115000"/>
-                        </a:lnSpc>
-                        <a:spcBef>
-                          <a:spcPts val="0"/>
-                        </a:spcBef>
-                        <a:spcAft>
-                          <a:spcPts val="0"/>
-                        </a:spcAft>
-                        <a:buNone/>
-                      </a:pPr>
-                      <a:r>
-                        <a:rPr lang="en-US" sz="1200" u="none" strike="noStrike" cap="none"/>
-                        <a:t>30m</a:t>
-                      </a:r>
-                      <a:endParaRPr sz="1100" u="none" strike="noStrike" cap="none">
-                        <a:latin typeface="Calibri"/>
-                        <a:ea typeface="Calibri"/>
-                        <a:cs typeface="Calibri"/>
-                        <a:sym typeface="Calibri"/>
-                      </a:endParaRPr>
-                    </a:p>
-                  </a:txBody>
-                  <a:tcPr marL="40925" marR="40925" marT="0" marB="0"/>
-                </a:tc>
-                <a:tc>
-                  <a:txBody>
-                    <a:bodyPr/>
-                    <a:lstStyle/>
-                    <a:p>
-                      <a:pPr marL="0" marR="0" lvl="0" indent="0" algn="l" rtl="0">
-                        <a:lnSpc>
-                          <a:spcPct val="115000"/>
-                        </a:lnSpc>
-                        <a:spcBef>
-                          <a:spcPts val="0"/>
-                        </a:spcBef>
-                        <a:spcAft>
-                          <a:spcPts val="0"/>
-                        </a:spcAft>
-                        <a:buNone/>
-                      </a:pPr>
-                      <a:r>
-                        <a:rPr lang="en-US" sz="1200" u="none" strike="noStrike" cap="none"/>
-                        <a:t>Extracted from land cover for the processing date.</a:t>
-                      </a:r>
-                      <a:endParaRPr sz="1100" u="none" strike="noStrike" cap="none">
-                        <a:latin typeface="Calibri"/>
-                        <a:ea typeface="Calibri"/>
-                        <a:cs typeface="Calibri"/>
-                        <a:sym typeface="Calibri"/>
-                      </a:endParaRPr>
-                    </a:p>
-                  </a:txBody>
-                  <a:tcPr marL="40925" marR="40925" marT="0" marB="0"/>
-                </a:tc>
-                <a:extLst>
-                  <a:ext uri="{0D108BD9-81ED-4DB2-BD59-A6C34878D82A}">
-                    <a16:rowId xmlns:a16="http://schemas.microsoft.com/office/drawing/2014/main" val="10008"/>
-                  </a:ext>
-                </a:extLst>
-              </a:tr>
-            </a:tbl>
-          </a:graphicData>
-        </a:graphic>
-      </p:graphicFrame>
+        </p:nvPicPr>
+        <p:blipFill rotWithShape="1">
+          <a:blip r:embed="rId3"/>
+          <a:srcRect l="32404" t="14814" r="17541" b="45870"/>
+          <a:stretch/>
+        </p:blipFill>
+        <p:spPr>
+          <a:xfrm>
+            <a:off x="0" y="4360985"/>
+            <a:ext cx="4577082" cy="2259623"/>
+          </a:xfrm>
+          <a:prstGeom prst="rect">
+            <a:avLst/>
+          </a:prstGeom>
+        </p:spPr>
+      </p:pic>
     </p:spTree>
   </p:cSld>
   <p:clrMapOvr>

</xml_diff>

<commit_message>
letzte Vorbereitungen der Abgabe
</commit_message>
<xml_diff>
--- a/Daten zusammentragen für die Abgabe/Präsentation/Presentation_01.pptx
+++ b/Daten zusammentragen für die Abgabe/Präsentation/Presentation_01.pptx
@@ -612,7 +612,7 @@
                 <a:ea typeface="+mn-ea"/>
                 <a:cs typeface="+mn-cs"/>
               </a:rPr>
-              <a:t>Samstag noch Christi Himmelfahrt und Pfingstbrückentag --&gt; deshalb Ferien 1 und nach </a:t>
+              <a:t>Samstag nach Christi Himmelfahrt und Pfingstbrückentag --&gt; deshalb Ferien 1 und nach </a:t>
             </a:r>
             <a:r>
               <a:rPr lang="de-DE" sz="1200" kern="1200" dirty="0" err="1">
@@ -710,19 +710,7 @@
                 <a:ea typeface="+mn-ea"/>
                 <a:cs typeface="+mn-cs"/>
               </a:rPr>
-              <a:t> und Variablen </a:t>
-            </a:r>
-            <a:r>
-              <a:rPr lang="de-DE" sz="1200" kern="1200">
-                <a:solidFill>
-                  <a:schemeClr val="tx1"/>
-                </a:solidFill>
-                <a:effectLst/>
-                <a:latin typeface="+mn-lt"/>
-                <a:ea typeface="+mn-ea"/>
-                <a:cs typeface="+mn-cs"/>
-              </a:rPr>
-              <a:t>je Warengruppe</a:t>
+              <a:t> und Variablen je Warengruppe</a:t>
             </a:r>
             <a:endParaRPr lang="de-DE" dirty="0"/>
           </a:p>
@@ -955,7 +943,7 @@
           <a:p>
             <a:fld id="{B493CCE5-52CF-4DCD-8401-17C426B71351}" type="datetimeFigureOut">
               <a:rPr lang="de-DE" smtClean="0"/>
-              <a:t>28.01.2020</a:t>
+              <a:t>30.01.2020</a:t>
             </a:fld>
             <a:endParaRPr lang="de-DE"/>
           </a:p>
@@ -1230,7 +1218,7 @@
           <a:p>
             <a:fld id="{B493CCE5-52CF-4DCD-8401-17C426B71351}" type="datetimeFigureOut">
               <a:rPr lang="de-DE" smtClean="0"/>
-              <a:t>28.01.2020</a:t>
+              <a:t>30.01.2020</a:t>
             </a:fld>
             <a:endParaRPr lang="de-DE"/>
           </a:p>
@@ -1424,7 +1412,7 @@
           <a:p>
             <a:fld id="{B493CCE5-52CF-4DCD-8401-17C426B71351}" type="datetimeFigureOut">
               <a:rPr lang="de-DE" smtClean="0"/>
-              <a:t>28.01.2020</a:t>
+              <a:t>30.01.2020</a:t>
             </a:fld>
             <a:endParaRPr lang="de-DE"/>
           </a:p>
@@ -1697,7 +1685,7 @@
           <a:p>
             <a:fld id="{B493CCE5-52CF-4DCD-8401-17C426B71351}" type="datetimeFigureOut">
               <a:rPr lang="de-DE" smtClean="0"/>
-              <a:t>28.01.2020</a:t>
+              <a:t>30.01.2020</a:t>
             </a:fld>
             <a:endParaRPr lang="de-DE"/>
           </a:p>
@@ -2038,7 +2026,7 @@
           <a:p>
             <a:fld id="{B493CCE5-52CF-4DCD-8401-17C426B71351}" type="datetimeFigureOut">
               <a:rPr lang="de-DE" smtClean="0"/>
-              <a:t>28.01.2020</a:t>
+              <a:t>30.01.2020</a:t>
             </a:fld>
             <a:endParaRPr lang="de-DE"/>
           </a:p>
@@ -2661,7 +2649,7 @@
           <a:p>
             <a:fld id="{B493CCE5-52CF-4DCD-8401-17C426B71351}" type="datetimeFigureOut">
               <a:rPr lang="de-DE" smtClean="0"/>
-              <a:t>28.01.2020</a:t>
+              <a:t>30.01.2020</a:t>
             </a:fld>
             <a:endParaRPr lang="de-DE"/>
           </a:p>
@@ -3521,7 +3509,7 @@
           <a:p>
             <a:fld id="{B493CCE5-52CF-4DCD-8401-17C426B71351}" type="datetimeFigureOut">
               <a:rPr lang="de-DE" smtClean="0"/>
-              <a:t>28.01.2020</a:t>
+              <a:t>30.01.2020</a:t>
             </a:fld>
             <a:endParaRPr lang="de-DE"/>
           </a:p>
@@ -3691,7 +3679,7 @@
           <a:p>
             <a:fld id="{B493CCE5-52CF-4DCD-8401-17C426B71351}" type="datetimeFigureOut">
               <a:rPr lang="de-DE" smtClean="0"/>
-              <a:t>28.01.2020</a:t>
+              <a:t>30.01.2020</a:t>
             </a:fld>
             <a:endParaRPr lang="de-DE"/>
           </a:p>
@@ -3871,7 +3859,7 @@
           <a:p>
             <a:fld id="{B493CCE5-52CF-4DCD-8401-17C426B71351}" type="datetimeFigureOut">
               <a:rPr lang="de-DE" smtClean="0"/>
-              <a:t>28.01.2020</a:t>
+              <a:t>30.01.2020</a:t>
             </a:fld>
             <a:endParaRPr lang="de-DE"/>
           </a:p>
@@ -4041,7 +4029,7 @@
           <a:p>
             <a:fld id="{B493CCE5-52CF-4DCD-8401-17C426B71351}" type="datetimeFigureOut">
               <a:rPr lang="de-DE" smtClean="0"/>
-              <a:t>28.01.2020</a:t>
+              <a:t>30.01.2020</a:t>
             </a:fld>
             <a:endParaRPr lang="de-DE"/>
           </a:p>
@@ -4288,7 +4276,7 @@
           <a:p>
             <a:fld id="{B493CCE5-52CF-4DCD-8401-17C426B71351}" type="datetimeFigureOut">
               <a:rPr lang="de-DE" smtClean="0"/>
-              <a:t>28.01.2020</a:t>
+              <a:t>30.01.2020</a:t>
             </a:fld>
             <a:endParaRPr lang="de-DE"/>
           </a:p>
@@ -4580,7 +4568,7 @@
           <a:p>
             <a:fld id="{B493CCE5-52CF-4DCD-8401-17C426B71351}" type="datetimeFigureOut">
               <a:rPr lang="de-DE" smtClean="0"/>
-              <a:t>28.01.2020</a:t>
+              <a:t>30.01.2020</a:t>
             </a:fld>
             <a:endParaRPr lang="de-DE"/>
           </a:p>
@@ -5024,7 +5012,7 @@
           <a:p>
             <a:fld id="{B493CCE5-52CF-4DCD-8401-17C426B71351}" type="datetimeFigureOut">
               <a:rPr lang="de-DE" smtClean="0"/>
-              <a:t>28.01.2020</a:t>
+              <a:t>30.01.2020</a:t>
             </a:fld>
             <a:endParaRPr lang="de-DE"/>
           </a:p>
@@ -5142,7 +5130,7 @@
           <a:p>
             <a:fld id="{B493CCE5-52CF-4DCD-8401-17C426B71351}" type="datetimeFigureOut">
               <a:rPr lang="de-DE" smtClean="0"/>
-              <a:t>28.01.2020</a:t>
+              <a:t>30.01.2020</a:t>
             </a:fld>
             <a:endParaRPr lang="de-DE"/>
           </a:p>
@@ -5237,7 +5225,7 @@
           <a:p>
             <a:fld id="{B493CCE5-52CF-4DCD-8401-17C426B71351}" type="datetimeFigureOut">
               <a:rPr lang="de-DE" smtClean="0"/>
-              <a:t>28.01.2020</a:t>
+              <a:t>30.01.2020</a:t>
             </a:fld>
             <a:endParaRPr lang="de-DE"/>
           </a:p>
@@ -5516,7 +5504,7 @@
           <a:p>
             <a:fld id="{B493CCE5-52CF-4DCD-8401-17C426B71351}" type="datetimeFigureOut">
               <a:rPr lang="de-DE" smtClean="0"/>
-              <a:t>28.01.2020</a:t>
+              <a:t>30.01.2020</a:t>
             </a:fld>
             <a:endParaRPr lang="de-DE"/>
           </a:p>
@@ -5791,7 +5779,7 @@
           <a:p>
             <a:fld id="{B493CCE5-52CF-4DCD-8401-17C426B71351}" type="datetimeFigureOut">
               <a:rPr lang="de-DE" smtClean="0"/>
-              <a:t>28.01.2020</a:t>
+              <a:t>30.01.2020</a:t>
             </a:fld>
             <a:endParaRPr lang="de-DE"/>
           </a:p>
@@ -6356,7 +6344,7 @@
           <a:p>
             <a:fld id="{4AAD347D-5ACD-4C99-B74B-A9C85AD731AF}" type="datetimeFigureOut">
               <a:rPr lang="en-US" dirty="0"/>
-              <a:t>1/28/2020</a:t>
+              <a:t>1/30/2020</a:t>
             </a:fld>
             <a:endParaRPr lang="en-US" dirty="0"/>
           </a:p>

</xml_diff>